<commit_message>
MaJ de la doc, petite refacto
</commit_message>
<xml_diff>
--- a/Architecture.pptx
+++ b/Architecture.pptx
@@ -11,8 +11,10 @@
     <p:sldId id="259" r:id="rId5"/>
     <p:sldId id="260" r:id="rId6"/>
     <p:sldId id="261" r:id="rId7"/>
-    <p:sldId id="262" r:id="rId8"/>
-    <p:sldId id="263" r:id="rId9"/>
+    <p:sldId id="264" r:id="rId8"/>
+    <p:sldId id="262" r:id="rId9"/>
+    <p:sldId id="263" r:id="rId10"/>
+    <p:sldId id="265" r:id="rId11"/>
   </p:sldIdLst>
   <p:sldSz cx="12192000" cy="6858000"/>
   <p:notesSz cx="6858000" cy="9144000"/>
@@ -111,6 +113,11 @@
       </a:defRPr>
     </a:lvl9pPr>
   </p:defaultTextStyle>
+  <p:extLst>
+    <p:ext uri="{EFAFB233-063F-42B5-8137-9DF3F51BA10A}">
+      <p15:sldGuideLst xmlns:p15="http://schemas.microsoft.com/office/powerpoint/2012/main"/>
+    </p:ext>
+  </p:extLst>
 </p:presentation>
 </file>
 
@@ -261,7 +268,7 @@
           <a:p>
             <a:fld id="{45A70323-C10B-4DA8-BC9D-DE8C4A0E6D0C}" type="datetimeFigureOut">
               <a:rPr lang="fr-FR" smtClean="0"/>
-              <a:t>27/07/2018</a:t>
+              <a:t>24/08/2018</a:t>
             </a:fld>
             <a:endParaRPr lang="fr-FR"/>
           </a:p>
@@ -459,7 +466,7 @@
           <a:p>
             <a:fld id="{45A70323-C10B-4DA8-BC9D-DE8C4A0E6D0C}" type="datetimeFigureOut">
               <a:rPr lang="fr-FR" smtClean="0"/>
-              <a:t>27/07/2018</a:t>
+              <a:t>24/08/2018</a:t>
             </a:fld>
             <a:endParaRPr lang="fr-FR"/>
           </a:p>
@@ -667,7 +674,7 @@
           <a:p>
             <a:fld id="{45A70323-C10B-4DA8-BC9D-DE8C4A0E6D0C}" type="datetimeFigureOut">
               <a:rPr lang="fr-FR" smtClean="0"/>
-              <a:t>27/07/2018</a:t>
+              <a:t>24/08/2018</a:t>
             </a:fld>
             <a:endParaRPr lang="fr-FR"/>
           </a:p>
@@ -865,7 +872,7 @@
           <a:p>
             <a:fld id="{45A70323-C10B-4DA8-BC9D-DE8C4A0E6D0C}" type="datetimeFigureOut">
               <a:rPr lang="fr-FR" smtClean="0"/>
-              <a:t>27/07/2018</a:t>
+              <a:t>24/08/2018</a:t>
             </a:fld>
             <a:endParaRPr lang="fr-FR"/>
           </a:p>
@@ -1140,7 +1147,7 @@
           <a:p>
             <a:fld id="{45A70323-C10B-4DA8-BC9D-DE8C4A0E6D0C}" type="datetimeFigureOut">
               <a:rPr lang="fr-FR" smtClean="0"/>
-              <a:t>27/07/2018</a:t>
+              <a:t>24/08/2018</a:t>
             </a:fld>
             <a:endParaRPr lang="fr-FR"/>
           </a:p>
@@ -1405,7 +1412,7 @@
           <a:p>
             <a:fld id="{45A70323-C10B-4DA8-BC9D-DE8C4A0E6D0C}" type="datetimeFigureOut">
               <a:rPr lang="fr-FR" smtClean="0"/>
-              <a:t>27/07/2018</a:t>
+              <a:t>24/08/2018</a:t>
             </a:fld>
             <a:endParaRPr lang="fr-FR"/>
           </a:p>
@@ -1817,7 +1824,7 @@
           <a:p>
             <a:fld id="{45A70323-C10B-4DA8-BC9D-DE8C4A0E6D0C}" type="datetimeFigureOut">
               <a:rPr lang="fr-FR" smtClean="0"/>
-              <a:t>27/07/2018</a:t>
+              <a:t>24/08/2018</a:t>
             </a:fld>
             <a:endParaRPr lang="fr-FR"/>
           </a:p>
@@ -1958,7 +1965,7 @@
           <a:p>
             <a:fld id="{45A70323-C10B-4DA8-BC9D-DE8C4A0E6D0C}" type="datetimeFigureOut">
               <a:rPr lang="fr-FR" smtClean="0"/>
-              <a:t>27/07/2018</a:t>
+              <a:t>24/08/2018</a:t>
             </a:fld>
             <a:endParaRPr lang="fr-FR"/>
           </a:p>
@@ -2071,7 +2078,7 @@
           <a:p>
             <a:fld id="{45A70323-C10B-4DA8-BC9D-DE8C4A0E6D0C}" type="datetimeFigureOut">
               <a:rPr lang="fr-FR" smtClean="0"/>
-              <a:t>27/07/2018</a:t>
+              <a:t>24/08/2018</a:t>
             </a:fld>
             <a:endParaRPr lang="fr-FR"/>
           </a:p>
@@ -2382,7 +2389,7 @@
           <a:p>
             <a:fld id="{45A70323-C10B-4DA8-BC9D-DE8C4A0E6D0C}" type="datetimeFigureOut">
               <a:rPr lang="fr-FR" smtClean="0"/>
-              <a:t>27/07/2018</a:t>
+              <a:t>24/08/2018</a:t>
             </a:fld>
             <a:endParaRPr lang="fr-FR"/>
           </a:p>
@@ -2670,7 +2677,7 @@
           <a:p>
             <a:fld id="{45A70323-C10B-4DA8-BC9D-DE8C4A0E6D0C}" type="datetimeFigureOut">
               <a:rPr lang="fr-FR" smtClean="0"/>
-              <a:t>27/07/2018</a:t>
+              <a:t>24/08/2018</a:t>
             </a:fld>
             <a:endParaRPr lang="fr-FR"/>
           </a:p>
@@ -2911,7 +2918,7 @@
           <a:p>
             <a:fld id="{45A70323-C10B-4DA8-BC9D-DE8C4A0E6D0C}" type="datetimeFigureOut">
               <a:rPr lang="fr-FR" smtClean="0"/>
-              <a:t>27/07/2018</a:t>
+              <a:t>24/08/2018</a:t>
             </a:fld>
             <a:endParaRPr lang="fr-FR"/>
           </a:p>
@@ -3480,10 +3487,130 @@
           </a:prstGeom>
         </p:spPr>
       </p:pic>
+      <p:sp>
+        <p:nvSpPr>
+          <p:cNvPr id="3" name="ZoneTexte 2">
+            <a:extLst>
+              <a:ext uri="{FF2B5EF4-FFF2-40B4-BE49-F238E27FC236}">
+                <a16:creationId xmlns:a16="http://schemas.microsoft.com/office/drawing/2014/main" id="{C72D32FB-15F3-4F18-96C6-0F0D18329632}"/>
+              </a:ext>
+            </a:extLst>
+          </p:cNvPr>
+          <p:cNvSpPr txBox="1"/>
+          <p:nvPr/>
+        </p:nvSpPr>
+        <p:spPr>
+          <a:xfrm>
+            <a:off x="16913" y="6488668"/>
+            <a:ext cx="2528256" cy="369332"/>
+          </a:xfrm>
+          <a:prstGeom prst="rect">
+            <a:avLst/>
+          </a:prstGeom>
+          <a:noFill/>
+        </p:spPr>
+        <p:txBody>
+          <a:bodyPr wrap="none" rtlCol="0">
+            <a:spAutoFit/>
+          </a:bodyPr>
+          <a:lstStyle/>
+          <a:p>
+            <a:r>
+              <a:rPr lang="fr-FR" dirty="0"/>
+              <a:t>Mis à Jour le 24/08/2018</a:t>
+            </a:r>
+          </a:p>
+        </p:txBody>
+      </p:sp>
     </p:spTree>
     <p:extLst>
       <p:ext uri="{BB962C8B-B14F-4D97-AF65-F5344CB8AC3E}">
         <p14:creationId xmlns:p14="http://schemas.microsoft.com/office/powerpoint/2010/main" val="1672029633"/>
+      </p:ext>
+    </p:extLst>
+  </p:cSld>
+  <p:clrMapOvr>
+    <a:masterClrMapping/>
+  </p:clrMapOvr>
+</p:sld>
+</file>
+
+<file path=ppt/slides/slide10.xml><?xml version="1.0" encoding="utf-8"?>
+<p:sld xmlns:a="http://schemas.openxmlformats.org/drawingml/2006/main" xmlns:r="http://schemas.openxmlformats.org/officeDocument/2006/relationships" xmlns:p="http://schemas.openxmlformats.org/presentationml/2006/main">
+  <p:cSld>
+    <p:spTree>
+      <p:nvGrpSpPr>
+        <p:cNvPr id="1" name=""/>
+        <p:cNvGrpSpPr/>
+        <p:nvPr/>
+      </p:nvGrpSpPr>
+      <p:grpSpPr>
+        <a:xfrm>
+          <a:off x="0" y="0"/>
+          <a:ext cx="0" cy="0"/>
+          <a:chOff x="0" y="0"/>
+          <a:chExt cx="0" cy="0"/>
+        </a:xfrm>
+      </p:grpSpPr>
+      <p:sp>
+        <p:nvSpPr>
+          <p:cNvPr id="3" name="Espace réservé du contenu 2">
+            <a:extLst>
+              <a:ext uri="{FF2B5EF4-FFF2-40B4-BE49-F238E27FC236}">
+                <a16:creationId xmlns:a16="http://schemas.microsoft.com/office/drawing/2014/main" id="{AAB6B473-5E46-4843-BB3E-00574C965208}"/>
+              </a:ext>
+            </a:extLst>
+          </p:cNvPr>
+          <p:cNvSpPr>
+            <a:spLocks noGrp="1"/>
+          </p:cNvSpPr>
+          <p:nvPr>
+            <p:ph idx="1"/>
+          </p:nvPr>
+        </p:nvSpPr>
+        <p:spPr/>
+        <p:txBody>
+          <a:bodyPr/>
+          <a:lstStyle/>
+          <a:p>
+            <a:endParaRPr lang="fr-FR"/>
+          </a:p>
+        </p:txBody>
+      </p:sp>
+      <p:pic>
+        <p:nvPicPr>
+          <p:cNvPr id="5" name="Image 4">
+            <a:extLst>
+              <a:ext uri="{FF2B5EF4-FFF2-40B4-BE49-F238E27FC236}">
+                <a16:creationId xmlns:a16="http://schemas.microsoft.com/office/drawing/2014/main" id="{D1CC979A-5B41-4E89-9327-EC98390CB6F4}"/>
+              </a:ext>
+            </a:extLst>
+          </p:cNvPr>
+          <p:cNvPicPr>
+            <a:picLocks noChangeAspect="1"/>
+          </p:cNvPicPr>
+          <p:nvPr/>
+        </p:nvPicPr>
+        <p:blipFill>
+          <a:blip r:embed="rId2"/>
+          <a:stretch>
+            <a:fillRect/>
+          </a:stretch>
+        </p:blipFill>
+        <p:spPr>
+          <a:xfrm>
+            <a:off x="0" y="0"/>
+            <a:ext cx="12192000" cy="6858000"/>
+          </a:xfrm>
+          <a:prstGeom prst="rect">
+            <a:avLst/>
+          </a:prstGeom>
+        </p:spPr>
+      </p:pic>
+    </p:spTree>
+    <p:extLst>
+      <p:ext uri="{BB962C8B-B14F-4D97-AF65-F5344CB8AC3E}">
+        <p14:creationId xmlns:p14="http://schemas.microsoft.com/office/powerpoint/2010/main" val="3750185450"/>
       </p:ext>
     </p:extLst>
   </p:cSld>
@@ -4600,7 +4727,7 @@
               <a:buAutoNum type="arabicPeriod"/>
             </a:pPr>
             <a:r>
-              <a:rPr lang="fr-FR" dirty="0"/>
+              <a:rPr lang="fr-FR" strike="sngStrike" dirty="0"/>
               <a:t>Skip du découpage de la vidéo</a:t>
             </a:r>
           </a:p>
@@ -4627,7 +4754,7 @@
               <a:buAutoNum type="arabicPeriod"/>
             </a:pPr>
             <a:r>
-              <a:rPr lang="fr-FR" dirty="0"/>
+              <a:rPr lang="fr-FR" strike="sngStrike" dirty="0"/>
               <a:t>Skip de la reconnaissance faciale</a:t>
             </a:r>
           </a:p>
@@ -4788,36 +4915,35 @@
           </a:xfrm>
         </p:spPr>
         <p:txBody>
-          <a:bodyPr/>
+          <a:bodyPr>
+            <a:normAutofit fontScale="92500" lnSpcReduction="10000"/>
+          </a:bodyPr>
           <a:lstStyle/>
           <a:p>
             <a:r>
               <a:rPr lang="fr-FR" dirty="0"/>
-              <a:t>Le bouton vidéo ouvre le fichier</a:t>
+              <a:t>Le bouton vidéo appel directement la BLL qui va demander à l’utilisateur de lui donner des vidéo et qui va retourner à la WPF la liste des vidéo sélectionné</a:t>
             </a:r>
           </a:p>
           <a:p>
             <a:r>
               <a:rPr lang="fr-FR" dirty="0"/>
-              <a:t>Si le fichier est valide, initialise les donnée global dont vont se servir les </a:t>
+              <a:t>La demande de fichier vidéo se fait via l’objet IVideoProvider fournie dans le constructeur de VideoSplitter par Unity. Par exemple dans le projet WPF, c’est un l’objet VideoProviderWPF qui demande à l’utilisateur les fichier via un </a:t>
             </a:r>
             <a:r>
               <a:rPr lang="fr-FR" dirty="0" err="1"/>
-              <a:t>Task</a:t>
-            </a:r>
-            <a:r>
-              <a:rPr lang="fr-FR" dirty="0"/>
-              <a:t> de fragmentation et de reconnaissance faciale et les démarre</a:t>
-            </a:r>
+              <a:t>openfileDialog</a:t>
+            </a:r>
+            <a:endParaRPr lang="fr-FR" dirty="0"/>
           </a:p>
         </p:txBody>
       </p:sp>
       <p:pic>
         <p:nvPicPr>
-          <p:cNvPr id="5" name="Image 4">
-            <a:extLst>
-              <a:ext uri="{FF2B5EF4-FFF2-40B4-BE49-F238E27FC236}">
-                <a16:creationId xmlns:a16="http://schemas.microsoft.com/office/drawing/2014/main" id="{455DA8AB-C8AA-4580-AC9D-3DDF4D484397}"/>
+          <p:cNvPr id="4" name="Image 3">
+            <a:extLst>
+              <a:ext uri="{FF2B5EF4-FFF2-40B4-BE49-F238E27FC236}">
+                <a16:creationId xmlns:a16="http://schemas.microsoft.com/office/drawing/2014/main" id="{BCDE6F7A-E9E6-45E1-8FF3-565515163B4B}"/>
               </a:ext>
             </a:extLst>
           </p:cNvPr>
@@ -4834,8 +4960,8 @@
         </p:blipFill>
         <p:spPr>
           <a:xfrm>
-            <a:off x="5629275" y="1444625"/>
-            <a:ext cx="6696075" cy="3943350"/>
+            <a:off x="5505450" y="1905146"/>
+            <a:ext cx="6602226" cy="3047708"/>
           </a:xfrm>
           <a:prstGeom prst="rect">
             <a:avLst/>
@@ -4877,7 +5003,7 @@
           <p:cNvPr id="2" name="Titre 1">
             <a:extLst>
               <a:ext uri="{FF2B5EF4-FFF2-40B4-BE49-F238E27FC236}">
-                <a16:creationId xmlns:a16="http://schemas.microsoft.com/office/drawing/2014/main" id="{6AEA2E92-4218-4BDC-9C9F-45C10164CEF2}"/>
+                <a16:creationId xmlns:a16="http://schemas.microsoft.com/office/drawing/2014/main" id="{F36C0B5C-1602-4941-B092-ED08D4E182F8}"/>
               </a:ext>
             </a:extLst>
           </p:cNvPr>
@@ -4888,140 +5014,37 @@
             <p:ph type="title"/>
           </p:nvPr>
         </p:nvSpPr>
-        <p:spPr>
-          <a:xfrm>
-            <a:off x="0" y="18255"/>
-            <a:ext cx="10515600" cy="1325563"/>
-          </a:xfrm>
-        </p:spPr>
-        <p:txBody>
-          <a:bodyPr>
-            <a:normAutofit/>
-          </a:bodyPr>
-          <a:lstStyle/>
-          <a:p>
-            <a:r>
-              <a:rPr lang="fr-FR" sz="3200" dirty="0"/>
-              <a:t>Codage de la fragmentation</a:t>
-            </a:r>
-          </a:p>
-        </p:txBody>
-      </p:sp>
-      <p:sp>
-        <p:nvSpPr>
-          <p:cNvPr id="3" name="Espace réservé du contenu 2">
-            <a:extLst>
-              <a:ext uri="{FF2B5EF4-FFF2-40B4-BE49-F238E27FC236}">
-                <a16:creationId xmlns:a16="http://schemas.microsoft.com/office/drawing/2014/main" id="{11AF780A-4E5F-404F-B814-27798803144A}"/>
-              </a:ext>
-            </a:extLst>
-          </p:cNvPr>
-          <p:cNvSpPr>
-            <a:spLocks noGrp="1"/>
-          </p:cNvSpPr>
-          <p:nvPr>
-            <p:ph idx="1"/>
-          </p:nvPr>
-        </p:nvSpPr>
-        <p:spPr>
-          <a:xfrm>
-            <a:off x="0" y="1122148"/>
-            <a:ext cx="5075852" cy="5735851"/>
-          </a:xfrm>
-        </p:spPr>
-        <p:txBody>
-          <a:bodyPr>
-            <a:normAutofit lnSpcReduction="10000"/>
-          </a:bodyPr>
-          <a:lstStyle/>
-          <a:p>
-            <a:pPr marL="514350" indent="-514350">
-              <a:buAutoNum type="arabicPeriod"/>
-            </a:pPr>
+        <p:spPr/>
+        <p:txBody>
+          <a:bodyPr/>
+          <a:lstStyle/>
+          <a:p>
             <a:r>
               <a:rPr lang="fr-FR" dirty="0"/>
-              <a:t>Création de l’objet </a:t>
-            </a:r>
-            <a:r>
-              <a:rPr lang="fr-FR" dirty="0" err="1"/>
-              <a:t>reader</a:t>
-            </a:r>
-            <a:r>
+              <a:t>UML sommaire</a:t>
+            </a:r>
+            <a:br>
               <a:rPr lang="fr-FR" dirty="0"/>
-              <a:t> et </a:t>
-            </a:r>
-            <a:r>
-              <a:rPr lang="fr-FR" dirty="0" err="1"/>
-              <a:t>récuperation</a:t>
-            </a:r>
-            <a:r>
-              <a:rPr lang="fr-FR" dirty="0"/>
-              <a:t> de sa première frame</a:t>
-            </a:r>
-          </a:p>
-          <a:p>
-            <a:pPr marL="514350" indent="-514350">
-              <a:buAutoNum type="arabicPeriod"/>
-            </a:pPr>
-            <a:r>
-              <a:rPr lang="fr-FR" dirty="0"/>
-              <a:t>On lis temps qu’il reste des frames à lire, à moins qu’on stop le programme ou qu’on skip l’étape d’extraction d’image</a:t>
-            </a:r>
-          </a:p>
-          <a:p>
-            <a:pPr marL="514350" indent="-514350">
-              <a:buAutoNum type="arabicPeriod"/>
-            </a:pPr>
-            <a:r>
-              <a:rPr lang="fr-FR" dirty="0"/>
-              <a:t>Gestion de la pause, on rend la barre de chargement jaune</a:t>
-            </a:r>
-          </a:p>
-          <a:p>
-            <a:pPr marL="514350" indent="-514350">
-              <a:buAutoNum type="arabicPeriod"/>
-            </a:pPr>
-            <a:r>
-              <a:rPr lang="fr-FR" dirty="0"/>
-              <a:t>Sauvegarde de la frame dans le dossier </a:t>
-            </a:r>
-            <a:r>
-              <a:rPr lang="fr-FR" dirty="0" err="1"/>
-              <a:t>resultat</a:t>
-            </a:r>
-            <a:r>
-              <a:rPr lang="fr-FR" dirty="0"/>
-              <a:t>/fragmentation/</a:t>
-            </a:r>
-            <a:r>
-              <a:rPr lang="fr-FR" dirty="0" err="1"/>
-              <a:t>nomDuFichier</a:t>
-            </a:r>
-            <a:r>
-              <a:rPr lang="fr-FR" dirty="0"/>
-              <a:t>/</a:t>
-            </a:r>
-            <a:r>
-              <a:rPr lang="fr-FR" dirty="0" err="1"/>
-              <a:t>numeroDeFrame</a:t>
-            </a:r>
+            </a:br>
             <a:endParaRPr lang="fr-FR" dirty="0"/>
           </a:p>
         </p:txBody>
       </p:sp>
       <p:pic>
         <p:nvPicPr>
-          <p:cNvPr id="4" name="Image 3">
-            <a:extLst>
-              <a:ext uri="{FF2B5EF4-FFF2-40B4-BE49-F238E27FC236}">
-                <a16:creationId xmlns:a16="http://schemas.microsoft.com/office/drawing/2014/main" id="{AB784537-0C75-4EB0-A615-E64EED68716A}"/>
+          <p:cNvPr id="4" name="Espace réservé du contenu 3">
+            <a:extLst>
+              <a:ext uri="{FF2B5EF4-FFF2-40B4-BE49-F238E27FC236}">
+                <a16:creationId xmlns:a16="http://schemas.microsoft.com/office/drawing/2014/main" id="{756EA6A7-1450-4E37-AA43-CC7C53432B57}"/>
               </a:ext>
             </a:extLst>
           </p:cNvPr>
           <p:cNvPicPr>
-            <a:picLocks noChangeAspect="1"/>
+            <a:picLocks noGrp="1" noChangeAspect="1"/>
           </p:cNvPicPr>
-          <p:nvPr/>
+          <p:nvPr>
+            <p:ph idx="1"/>
+          </p:nvPr>
         </p:nvPicPr>
         <p:blipFill>
           <a:blip r:embed="rId2"/>
@@ -5031,8 +5054,8 @@
         </p:blipFill>
         <p:spPr>
           <a:xfrm>
-            <a:off x="5075852" y="0"/>
-            <a:ext cx="7232779" cy="5455232"/>
+            <a:off x="1157287" y="2653506"/>
+            <a:ext cx="9877425" cy="2695575"/>
           </a:xfrm>
           <a:prstGeom prst="rect">
             <a:avLst/>
@@ -5042,7 +5065,7 @@
     </p:spTree>
     <p:extLst>
       <p:ext uri="{BB962C8B-B14F-4D97-AF65-F5344CB8AC3E}">
-        <p14:creationId xmlns:p14="http://schemas.microsoft.com/office/powerpoint/2010/main" val="1053865752"/>
+        <p14:creationId xmlns:p14="http://schemas.microsoft.com/office/powerpoint/2010/main" val="4006912742"/>
       </p:ext>
     </p:extLst>
   </p:cSld>
@@ -5074,7 +5097,7 @@
           <p:cNvPr id="2" name="Titre 1">
             <a:extLst>
               <a:ext uri="{FF2B5EF4-FFF2-40B4-BE49-F238E27FC236}">
-                <a16:creationId xmlns:a16="http://schemas.microsoft.com/office/drawing/2014/main" id="{236E573C-144E-4BA8-9F87-0B22FA07C8B9}"/>
+                <a16:creationId xmlns:a16="http://schemas.microsoft.com/office/drawing/2014/main" id="{6AEA2E92-4218-4BDC-9C9F-45C10164CEF2}"/>
               </a:ext>
             </a:extLst>
           </p:cNvPr>
@@ -5087,7 +5110,266 @@
         </p:nvSpPr>
         <p:spPr>
           <a:xfrm>
-            <a:off x="0" y="18255"/>
+            <a:off x="0" y="18256"/>
+            <a:ext cx="10515600" cy="756186"/>
+          </a:xfrm>
+        </p:spPr>
+        <p:txBody>
+          <a:bodyPr>
+            <a:normAutofit/>
+          </a:bodyPr>
+          <a:lstStyle/>
+          <a:p>
+            <a:r>
+              <a:rPr lang="fr-FR" sz="2400" dirty="0"/>
+              <a:t>Algo VideoSplitter</a:t>
+            </a:r>
+          </a:p>
+        </p:txBody>
+      </p:sp>
+      <p:sp>
+        <p:nvSpPr>
+          <p:cNvPr id="3" name="Espace réservé du contenu 2">
+            <a:extLst>
+              <a:ext uri="{FF2B5EF4-FFF2-40B4-BE49-F238E27FC236}">
+                <a16:creationId xmlns:a16="http://schemas.microsoft.com/office/drawing/2014/main" id="{11AF780A-4E5F-404F-B814-27798803144A}"/>
+              </a:ext>
+            </a:extLst>
+          </p:cNvPr>
+          <p:cNvSpPr>
+            <a:spLocks noGrp="1"/>
+          </p:cNvSpPr>
+          <p:nvPr>
+            <p:ph idx="1"/>
+          </p:nvPr>
+        </p:nvSpPr>
+        <p:spPr>
+          <a:xfrm>
+            <a:off x="0" y="905071"/>
+            <a:ext cx="12192000" cy="6298162"/>
+          </a:xfrm>
+        </p:spPr>
+        <p:txBody>
+          <a:bodyPr>
+            <a:normAutofit/>
+          </a:bodyPr>
+          <a:lstStyle/>
+          <a:p>
+            <a:pPr marL="514350" indent="-514350">
+              <a:buAutoNum type="arabicPeriod"/>
+            </a:pPr>
+            <a:r>
+              <a:rPr lang="fr-FR" dirty="0" err="1"/>
+              <a:t>SplitAndFaceRecoAllVideoAsync</a:t>
+            </a:r>
+            <a:endParaRPr lang="fr-FR" dirty="0"/>
+          </a:p>
+          <a:p>
+            <a:pPr marL="971550" lvl="1" indent="-514350">
+              <a:buAutoNum type="arabicPeriod"/>
+            </a:pPr>
+            <a:r>
+              <a:rPr lang="fr-FR" dirty="0"/>
+              <a:t>Récupération des fichier voulue via IVideoProvider</a:t>
+            </a:r>
+          </a:p>
+          <a:p>
+            <a:pPr marL="971550" lvl="1" indent="-514350">
+              <a:buAutoNum type="arabicPeriod"/>
+            </a:pPr>
+            <a:r>
+              <a:rPr lang="fr-FR" dirty="0"/>
+              <a:t>Pour chaque fichier </a:t>
+            </a:r>
+          </a:p>
+          <a:p>
+            <a:pPr marL="1428750" lvl="2" indent="-514350">
+              <a:buAutoNum type="arabicPeriod"/>
+            </a:pPr>
+            <a:r>
+              <a:rPr lang="fr-FR" dirty="0"/>
+              <a:t>Ajouter un objet dans le dictionnaire d’observer avec le nom du fichier en clé</a:t>
+            </a:r>
+          </a:p>
+          <a:p>
+            <a:pPr marL="1428750" lvl="2" indent="-514350">
+              <a:buFont typeface="Arial" panose="020B0604020202020204" pitchFamily="34" charset="0"/>
+              <a:buAutoNum type="arabicPeriod"/>
+            </a:pPr>
+            <a:r>
+              <a:rPr lang="fr-FR" dirty="0"/>
+              <a:t>Ajouter un objet dans le dictionnaire de </a:t>
+            </a:r>
+            <a:r>
+              <a:rPr lang="fr-FR" dirty="0" err="1"/>
+              <a:t>FaceRecognizer</a:t>
+            </a:r>
+            <a:r>
+              <a:rPr lang="fr-FR" dirty="0"/>
+              <a:t> avec le nom du fichier en clé</a:t>
+            </a:r>
+          </a:p>
+          <a:p>
+            <a:pPr marL="1428750" lvl="2" indent="-514350">
+              <a:buAutoNum type="arabicPeriod"/>
+            </a:pPr>
+            <a:r>
+              <a:rPr lang="fr-FR" dirty="0"/>
+              <a:t>Lancer une </a:t>
+            </a:r>
+            <a:r>
+              <a:rPr lang="fr-FR" dirty="0" err="1"/>
+              <a:t>Task.Run</a:t>
+            </a:r>
+            <a:r>
+              <a:rPr lang="fr-FR" dirty="0"/>
+              <a:t> de la fonction Split() avec le fichier et le </a:t>
+            </a:r>
+            <a:r>
+              <a:rPr lang="fr-FR" dirty="0" err="1"/>
+              <a:t>path</a:t>
+            </a:r>
+            <a:r>
+              <a:rPr lang="fr-FR" dirty="0"/>
+              <a:t> d’exécution du programme</a:t>
+            </a:r>
+          </a:p>
+          <a:p>
+            <a:pPr marL="971550" lvl="1" indent="-514350">
+              <a:buAutoNum type="arabicPeriod"/>
+            </a:pPr>
+            <a:r>
+              <a:rPr lang="fr-FR" dirty="0"/>
+              <a:t>Retourne la liste des fichier sélectionné par l’utilisateur à l’interface appelant, que ce soit une console ou un WPF</a:t>
+            </a:r>
+          </a:p>
+          <a:p>
+            <a:pPr marL="514350" indent="-514350">
+              <a:buAutoNum type="arabicPeriod"/>
+            </a:pPr>
+            <a:r>
+              <a:rPr lang="fr-FR" dirty="0"/>
+              <a:t>Split</a:t>
+            </a:r>
+          </a:p>
+          <a:p>
+            <a:pPr marL="971550" lvl="1" indent="-514350">
+              <a:buAutoNum type="arabicPeriod"/>
+            </a:pPr>
+            <a:r>
+              <a:rPr lang="fr-FR" dirty="0"/>
+              <a:t>Créer le dossier output si il n’existe pas</a:t>
+            </a:r>
+          </a:p>
+          <a:p>
+            <a:pPr marL="971550" lvl="1" indent="-514350">
+              <a:buAutoNum type="arabicPeriod"/>
+            </a:pPr>
+            <a:r>
+              <a:rPr lang="fr-FR" dirty="0"/>
+              <a:t>Ouverture du fichier vidéo</a:t>
+            </a:r>
+          </a:p>
+          <a:p>
+            <a:pPr marL="971550" lvl="1" indent="-514350">
+              <a:buAutoNum type="arabicPeriod"/>
+            </a:pPr>
+            <a:r>
+              <a:rPr lang="fr-FR" dirty="0"/>
+              <a:t>Pour chaque frame</a:t>
+            </a:r>
+          </a:p>
+          <a:p>
+            <a:pPr marL="1428750" lvl="2" indent="-514350">
+              <a:buAutoNum type="arabicPeriod"/>
+            </a:pPr>
+            <a:r>
+              <a:rPr lang="fr-FR" dirty="0"/>
+              <a:t>Sauvegarde de la frame dans le dossier d’output</a:t>
+            </a:r>
+          </a:p>
+          <a:p>
+            <a:pPr marL="1428750" lvl="2" indent="-514350">
+              <a:buAutoNum type="arabicPeriod"/>
+            </a:pPr>
+            <a:r>
+              <a:rPr lang="fr-FR" dirty="0"/>
+              <a:t>Notification à l’observer de </a:t>
+            </a:r>
+            <a:r>
+              <a:rPr lang="fr-FR" u="sng" dirty="0"/>
+              <a:t>ce fichier vidéo (via le dictionnaire)</a:t>
+            </a:r>
+            <a:endParaRPr lang="fr-FR" dirty="0"/>
+          </a:p>
+          <a:p>
+            <a:pPr marL="1428750" lvl="2" indent="-514350">
+              <a:buAutoNum type="arabicPeriod"/>
+            </a:pPr>
+            <a:r>
+              <a:rPr lang="fr-FR" dirty="0"/>
+              <a:t>lancement de l’analyse asynchrone via l’objet FaceRecognition </a:t>
+            </a:r>
+            <a:r>
+              <a:rPr lang="fr-FR" u="sng" dirty="0"/>
+              <a:t>de ce fichier vidéo </a:t>
+            </a:r>
+            <a:r>
+              <a:rPr lang="fr-FR" dirty="0"/>
+              <a:t>(via le dictionnaire)</a:t>
+            </a:r>
+          </a:p>
+        </p:txBody>
+      </p:sp>
+    </p:spTree>
+    <p:extLst>
+      <p:ext uri="{BB962C8B-B14F-4D97-AF65-F5344CB8AC3E}">
+        <p14:creationId xmlns:p14="http://schemas.microsoft.com/office/powerpoint/2010/main" val="1053865752"/>
+      </p:ext>
+    </p:extLst>
+  </p:cSld>
+  <p:clrMapOvr>
+    <a:masterClrMapping/>
+  </p:clrMapOvr>
+</p:sld>
+</file>
+
+<file path=ppt/slides/slide9.xml><?xml version="1.0" encoding="utf-8"?>
+<p:sld xmlns:a="http://schemas.openxmlformats.org/drawingml/2006/main" xmlns:r="http://schemas.openxmlformats.org/officeDocument/2006/relationships" xmlns:p="http://schemas.openxmlformats.org/presentationml/2006/main">
+  <p:cSld>
+    <p:spTree>
+      <p:nvGrpSpPr>
+        <p:cNvPr id="1" name=""/>
+        <p:cNvGrpSpPr/>
+        <p:nvPr/>
+      </p:nvGrpSpPr>
+      <p:grpSpPr>
+        <a:xfrm>
+          <a:off x="0" y="0"/>
+          <a:ext cx="0" cy="0"/>
+          <a:chOff x="0" y="0"/>
+          <a:chExt cx="0" cy="0"/>
+        </a:xfrm>
+      </p:grpSpPr>
+      <p:sp>
+        <p:nvSpPr>
+          <p:cNvPr id="2" name="Titre 1">
+            <a:extLst>
+              <a:ext uri="{FF2B5EF4-FFF2-40B4-BE49-F238E27FC236}">
+                <a16:creationId xmlns:a16="http://schemas.microsoft.com/office/drawing/2014/main" id="{236E573C-144E-4BA8-9F87-0B22FA07C8B9}"/>
+              </a:ext>
+            </a:extLst>
+          </p:cNvPr>
+          <p:cNvSpPr>
+            <a:spLocks noGrp="1"/>
+          </p:cNvSpPr>
+          <p:nvPr>
+            <p:ph type="title"/>
+          </p:nvPr>
+        </p:nvSpPr>
+        <p:spPr>
+          <a:xfrm>
+            <a:off x="0" y="-270994"/>
             <a:ext cx="10515600" cy="1325563"/>
           </a:xfrm>
         </p:spPr>
@@ -5098,9 +5380,14 @@
           <a:lstStyle/>
           <a:p>
             <a:r>
-              <a:rPr lang="fr-FR" sz="3200" dirty="0"/>
-              <a:t>Codage de la reconnaissance de visage</a:t>
-            </a:r>
+              <a:rPr lang="fr-FR" sz="2400" dirty="0"/>
+              <a:t>Algo </a:t>
+            </a:r>
+            <a:r>
+              <a:rPr lang="fr-FR" sz="2400" dirty="0" err="1"/>
+              <a:t>FaceRecognizer</a:t>
+            </a:r>
+            <a:endParaRPr lang="fr-FR" sz="2400" dirty="0"/>
           </a:p>
         </p:txBody>
       </p:sp>
@@ -5122,48 +5409,253 @@
         </p:nvSpPr>
         <p:spPr>
           <a:xfrm>
-            <a:off x="0" y="1343818"/>
-            <a:ext cx="10515600" cy="4351338"/>
+            <a:off x="0" y="811763"/>
+            <a:ext cx="10515600" cy="6027981"/>
           </a:xfrm>
         </p:spPr>
         <p:txBody>
-          <a:bodyPr/>
-          <a:lstStyle/>
-          <a:p>
+          <a:bodyPr>
+            <a:normAutofit/>
+          </a:bodyPr>
+          <a:lstStyle/>
+          <a:p>
+            <a:pPr marL="0" indent="0">
+              <a:buNone/>
+            </a:pPr>
+            <a:r>
+              <a:rPr lang="fr-FR" sz="2400" dirty="0" err="1"/>
+              <a:t>FaceRecoAsync</a:t>
+            </a:r>
+            <a:r>
+              <a:rPr lang="fr-FR" sz="2400" dirty="0"/>
+              <a:t>()</a:t>
+            </a:r>
+          </a:p>
+          <a:p>
+            <a:pPr marL="514350" indent="-514350">
+              <a:buFont typeface="+mj-lt"/>
+              <a:buAutoNum type="arabicPeriod"/>
+            </a:pPr>
+            <a:r>
+              <a:rPr lang="fr-FR" sz="2400" dirty="0"/>
+              <a:t>Ajout du </a:t>
+            </a:r>
+            <a:r>
+              <a:rPr lang="fr-FR" sz="2400" dirty="0" err="1"/>
+              <a:t>path</a:t>
+            </a:r>
+            <a:r>
+              <a:rPr lang="fr-FR" sz="2400" dirty="0"/>
+              <a:t> de l’image à analyser à la </a:t>
+            </a:r>
+            <a:r>
+              <a:rPr lang="fr-FR" sz="2400" dirty="0" err="1"/>
+              <a:t>ConcurrentQueue</a:t>
+            </a:r>
+            <a:r>
+              <a:rPr lang="fr-FR" sz="2400" dirty="0"/>
+              <a:t> (version thread </a:t>
+            </a:r>
+            <a:r>
+              <a:rPr lang="fr-FR" sz="2400" dirty="0" err="1"/>
+              <a:t>safe</a:t>
+            </a:r>
+            <a:r>
+              <a:rPr lang="fr-FR" sz="2400" dirty="0"/>
+              <a:t> de queue)</a:t>
+            </a:r>
+          </a:p>
+          <a:p>
+            <a:pPr marL="514350" indent="-514350">
+              <a:buFont typeface="+mj-lt"/>
+              <a:buAutoNum type="arabicPeriod"/>
+            </a:pPr>
+            <a:r>
+              <a:rPr lang="fr-FR" sz="2400" dirty="0"/>
+              <a:t>Si la </a:t>
+            </a:r>
+            <a:r>
+              <a:rPr lang="fr-FR" sz="2400" dirty="0" err="1"/>
+              <a:t>list</a:t>
+            </a:r>
+            <a:r>
+              <a:rPr lang="fr-FR" sz="2400" dirty="0"/>
+              <a:t> de </a:t>
+            </a:r>
+            <a:r>
+              <a:rPr lang="fr-FR" sz="2400" dirty="0" err="1"/>
+              <a:t>task</a:t>
+            </a:r>
+            <a:r>
+              <a:rPr lang="fr-FR" sz="2400" dirty="0"/>
+              <a:t> contient moins d’éléments que le nombre max de thread simultané désiré</a:t>
+            </a:r>
+          </a:p>
+          <a:p>
+            <a:pPr marL="971550" lvl="1" indent="-514350">
+              <a:buFont typeface="+mj-lt"/>
+              <a:buAutoNum type="arabicPeriod"/>
+            </a:pPr>
+            <a:r>
+              <a:rPr lang="fr-FR" sz="2000" dirty="0"/>
+              <a:t>Lancement d’un </a:t>
+            </a:r>
+            <a:r>
+              <a:rPr lang="fr-FR" sz="2000" dirty="0" err="1"/>
+              <a:t>Task.Run</a:t>
+            </a:r>
+            <a:r>
+              <a:rPr lang="fr-FR" sz="2000" dirty="0"/>
+              <a:t>() de </a:t>
+            </a:r>
+            <a:r>
+              <a:rPr lang="fr-FR" sz="2000" dirty="0" err="1"/>
+              <a:t>FaceReco</a:t>
+            </a:r>
+            <a:r>
+              <a:rPr lang="fr-FR" sz="2000" dirty="0"/>
+              <a:t> </a:t>
+            </a:r>
+          </a:p>
+          <a:p>
+            <a:pPr marL="0" indent="0">
+              <a:buNone/>
+            </a:pPr>
+            <a:r>
+              <a:rPr lang="fr-FR" sz="2400" dirty="0" err="1"/>
+              <a:t>FaceReco</a:t>
+            </a:r>
+            <a:r>
+              <a:rPr lang="fr-FR" sz="2400" dirty="0"/>
+              <a:t>()</a:t>
+            </a:r>
+          </a:p>
+          <a:p>
+            <a:pPr marL="514350" indent="-514350">
+              <a:buFont typeface="+mj-lt"/>
+              <a:buAutoNum type="arabicPeriod"/>
+            </a:pPr>
+            <a:r>
+              <a:rPr lang="fr-FR" sz="2400" dirty="0"/>
+              <a:t>Tant qu’il y as des éléments dans la queue, qu’on ne nous dit pas s’</a:t>
+            </a:r>
+            <a:r>
+              <a:rPr lang="fr-FR" sz="2400" dirty="0" err="1"/>
+              <a:t>arreter</a:t>
+            </a:r>
+            <a:r>
+              <a:rPr lang="fr-FR" sz="2400" dirty="0"/>
+              <a:t>, et que le nombre de thread en cours est plus petit que le nombre désiré</a:t>
+            </a:r>
+          </a:p>
+          <a:p>
+            <a:pPr marL="971550" lvl="1" indent="-514350">
+              <a:buFont typeface="+mj-lt"/>
+              <a:buAutoNum type="arabicPeriod"/>
+            </a:pPr>
+            <a:r>
+              <a:rPr lang="fr-FR" sz="2000" dirty="0"/>
+              <a:t>Pop de la queue</a:t>
+            </a:r>
+          </a:p>
+          <a:p>
+            <a:pPr marL="971550" lvl="1" indent="-514350">
+              <a:buFont typeface="+mj-lt"/>
+              <a:buAutoNum type="arabicPeriod"/>
+            </a:pPr>
+            <a:r>
+              <a:rPr lang="fr-FR" sz="2000" dirty="0"/>
+              <a:t>Création de l’image pointé par le </a:t>
+            </a:r>
+            <a:r>
+              <a:rPr lang="fr-FR" sz="2000" dirty="0" err="1"/>
+              <a:t>path</a:t>
+            </a:r>
+            <a:r>
+              <a:rPr lang="fr-FR" sz="2000" dirty="0"/>
+              <a:t> </a:t>
+            </a:r>
+            <a:r>
+              <a:rPr lang="fr-FR" sz="2000" dirty="0" err="1"/>
+              <a:t>popé</a:t>
+            </a:r>
+            <a:r>
+              <a:rPr lang="fr-FR" sz="2000" dirty="0"/>
+              <a:t> de la queue</a:t>
+            </a:r>
+          </a:p>
+          <a:p>
+            <a:pPr marL="971550" lvl="1" indent="-514350">
+              <a:buFont typeface="+mj-lt"/>
+              <a:buAutoNum type="arabicPeriod"/>
+            </a:pPr>
+            <a:r>
+              <a:rPr lang="fr-FR" sz="2000" dirty="0"/>
+              <a:t>Récupération des rectangles représentant le(s) visage détecté sur l’image</a:t>
+            </a:r>
+          </a:p>
+          <a:p>
+            <a:pPr marL="971550" lvl="1" indent="-514350">
+              <a:buFont typeface="+mj-lt"/>
+              <a:buAutoNum type="arabicPeriod"/>
+            </a:pPr>
+            <a:r>
+              <a:rPr lang="fr-FR" sz="2000" dirty="0"/>
+              <a:t>Pour chaque rectangle</a:t>
+            </a:r>
+          </a:p>
+          <a:p>
+            <a:pPr marL="1428750" lvl="2" indent="-514350">
+              <a:buFont typeface="+mj-lt"/>
+              <a:buAutoNum type="arabicPeriod"/>
+            </a:pPr>
+            <a:r>
+              <a:rPr lang="fr-FR" sz="1800" dirty="0"/>
+              <a:t>Création d’une image découpé à partir de l’image chargé de la queue, au format du rectangle</a:t>
+            </a:r>
+          </a:p>
+          <a:p>
+            <a:pPr marL="1428750" lvl="2" indent="-514350">
+              <a:buFont typeface="+mj-lt"/>
+              <a:buAutoNum type="arabicPeriod"/>
+            </a:pPr>
+            <a:r>
+              <a:rPr lang="fr-FR" sz="1800" dirty="0"/>
+              <a:t>Sauvegarde de l’image</a:t>
+            </a:r>
+          </a:p>
+          <a:p>
+            <a:pPr marL="971550" lvl="1" indent="-514350">
+              <a:buFont typeface="+mj-lt"/>
+              <a:buAutoNum type="arabicPeriod"/>
+            </a:pPr>
+            <a:r>
+              <a:rPr lang="fr-FR" dirty="0"/>
+              <a:t>Notification à l’</a:t>
+            </a:r>
+            <a:r>
+              <a:rPr lang="fr-FR" dirty="0" err="1"/>
+              <a:t>observeur</a:t>
+            </a:r>
+            <a:r>
+              <a:rPr lang="fr-FR" dirty="0"/>
+              <a:t> du </a:t>
+            </a:r>
+            <a:r>
+              <a:rPr lang="fr-FR" dirty="0" err="1"/>
+              <a:t>FaceRecognizer</a:t>
+            </a:r>
             <a:endParaRPr lang="fr-FR" dirty="0"/>
           </a:p>
-        </p:txBody>
-      </p:sp>
-      <p:pic>
-        <p:nvPicPr>
-          <p:cNvPr id="5" name="Image 4">
-            <a:extLst>
-              <a:ext uri="{FF2B5EF4-FFF2-40B4-BE49-F238E27FC236}">
-                <a16:creationId xmlns:a16="http://schemas.microsoft.com/office/drawing/2014/main" id="{F5EAD0ED-D761-4F36-9CC9-7DB44831C2DB}"/>
-              </a:ext>
-            </a:extLst>
-          </p:cNvPr>
-          <p:cNvPicPr>
-            <a:picLocks noChangeAspect="1"/>
-          </p:cNvPicPr>
-          <p:nvPr/>
-        </p:nvPicPr>
-        <p:blipFill>
-          <a:blip r:embed="rId2"/>
-          <a:stretch>
-            <a:fillRect/>
-          </a:stretch>
-        </p:blipFill>
-        <p:spPr>
-          <a:xfrm>
-            <a:off x="5533053" y="951722"/>
-            <a:ext cx="6658947" cy="5906278"/>
-          </a:xfrm>
-          <a:prstGeom prst="rect">
-            <a:avLst/>
-          </a:prstGeom>
-        </p:spPr>
-      </p:pic>
+          <a:p>
+            <a:pPr marL="1428750" lvl="2" indent="-514350">
+              <a:buFont typeface="+mj-lt"/>
+              <a:buAutoNum type="arabicPeriod"/>
+            </a:pPr>
+            <a:endParaRPr lang="fr-FR" sz="1200" dirty="0"/>
+          </a:p>
+        </p:txBody>
+      </p:sp>
     </p:spTree>
     <p:extLst>
       <p:ext uri="{BB962C8B-B14F-4D97-AF65-F5344CB8AC3E}">

</xml_diff>